<commit_message>
added support for comments
</commit_message>
<xml_diff>
--- a/_tests/powerpoint.pptx
+++ b/_tests/powerpoint.pptx
@@ -136,6 +136,38 @@
         <a:r>
           <a:rPr lang="en-US"/>
           <a:t>Comment Text</a:t>
+        </a:r>
+      </a:p>
+    </p188:txBody>
+  </p188:cm>
+  <p188:cm id="{D271AAB4-1EF3-4CDC-B647-0AE9C5FFD7FC}" authorId="{ED181FB3-E6D1-F4DB-C37A-E82A0F5BE2CC}" created="2024-07-20T19:37:00.514">
+    <pc:sldMkLst xmlns:pc="http://schemas.microsoft.com/office/powerpoint/2013/main/command">
+      <pc:docMk/>
+      <pc:sldMk cId="3238791661" sldId="256"/>
+    </pc:sldMkLst>
+    <p188:txBody>
+      <a:bodyPr/>
+      <a:lstStyle/>
+      <a:p>
+        <a:r>
+          <a:rPr lang="en-US"/>
+          <a:t>AHHHHHHHHHHHHHHHHHHHHHHHHHHHHHHHHHHHHHHHHHHHHHHHHHHHHHHHHHHHHHHH</a:t>
+        </a:r>
+      </a:p>
+    </p188:txBody>
+  </p188:cm>
+  <p188:cm id="{C0BECDF4-5DA8-4687-A31C-7FF99CC32AFD}" authorId="{ED181FB3-E6D1-F4DB-C37A-E82A0F5BE2CC}" created="2024-07-20T19:46:48.584">
+    <pc:sldMkLst xmlns:pc="http://schemas.microsoft.com/office/powerpoint/2013/main/command">
+      <pc:docMk/>
+      <pc:sldMk cId="3238791661" sldId="256"/>
+    </pc:sldMkLst>
+    <p188:txBody>
+      <a:bodyPr/>
+      <a:lstStyle/>
+      <a:p>
+        <a:r>
+          <a:rPr lang="en-US"/>
+          <a:t>SECRET</a:t>
         </a:r>
       </a:p>
     </p188:txBody>
@@ -3976,7 +4008,7 @@
 </file>
 
 <file path=ppt/slides/slide2.xml><?xml version="1.0" encoding="utf-8"?>
-<p:sld xmlns:a="http://schemas.openxmlformats.org/drawingml/2006/main" xmlns:r="http://schemas.openxmlformats.org/officeDocument/2006/relationships" xmlns:p="http://schemas.openxmlformats.org/presentationml/2006/main">
+<p:sld xmlns:a="http://schemas.openxmlformats.org/drawingml/2006/main" xmlns:r="http://schemas.openxmlformats.org/officeDocument/2006/relationships" xmlns:p="http://schemas.openxmlformats.org/presentationml/2006/main" show="0">
   <p:cSld>
     <p:spTree>
       <p:nvGrpSpPr>
@@ -4043,7 +4075,7 @@
           <a:p>
             <a:r>
               <a:rPr lang="en-US" dirty="0"/>
-              <a:t>Subtitle for slide 2</a:t>
+              <a:t>Subtitle for slide 2 TOP SECRET</a:t>
             </a:r>
           </a:p>
         </p:txBody>

</xml_diff>

<commit_message>
Updated powerpoint scanner function
</commit_message>
<xml_diff>
--- a/_tests/powerpoint.pptx
+++ b/_tests/powerpoint.pptx
@@ -278,7 +278,7 @@
           <a:p>
             <a:fld id="{F9EBC262-A8DB-4765-A294-A382EBBAE150}" type="datetimeFigureOut">
               <a:rPr lang="en-US" smtClean="0"/>
-              <a:t>7/20/2024</a:t>
+              <a:t>7/21/2024</a:t>
             </a:fld>
             <a:endParaRPr lang="en-US"/>
           </a:p>
@@ -590,8 +590,12 @@
           <a:lstStyle/>
           <a:p>
             <a:r>
+              <a:rPr lang="en-US"/>
+              <a:t>(S) Note </a:t>
+            </a:r>
+            <a:r>
               <a:rPr lang="en-US" dirty="0"/>
-              <a:t>Note Text</a:t>
+              <a:t>Text that is classified</a:t>
             </a:r>
           </a:p>
         </p:txBody>
@@ -866,7 +870,7 @@
           <a:p>
             <a:fld id="{0703EC54-8FB1-4E12-A495-72A239CB266A}" type="datetimeFigureOut">
               <a:rPr lang="en-US" smtClean="0"/>
-              <a:t>7/20/2024</a:t>
+              <a:t>7/21/2024</a:t>
             </a:fld>
             <a:endParaRPr lang="en-US"/>
           </a:p>
@@ -1064,7 +1068,7 @@
           <a:p>
             <a:fld id="{0703EC54-8FB1-4E12-A495-72A239CB266A}" type="datetimeFigureOut">
               <a:rPr lang="en-US" smtClean="0"/>
-              <a:t>7/20/2024</a:t>
+              <a:t>7/21/2024</a:t>
             </a:fld>
             <a:endParaRPr lang="en-US"/>
           </a:p>
@@ -1272,7 +1276,7 @@
           <a:p>
             <a:fld id="{0703EC54-8FB1-4E12-A495-72A239CB266A}" type="datetimeFigureOut">
               <a:rPr lang="en-US" smtClean="0"/>
-              <a:t>7/20/2024</a:t>
+              <a:t>7/21/2024</a:t>
             </a:fld>
             <a:endParaRPr lang="en-US"/>
           </a:p>
@@ -1470,7 +1474,7 @@
           <a:p>
             <a:fld id="{0703EC54-8FB1-4E12-A495-72A239CB266A}" type="datetimeFigureOut">
               <a:rPr lang="en-US" smtClean="0"/>
-              <a:t>7/20/2024</a:t>
+              <a:t>7/21/2024</a:t>
             </a:fld>
             <a:endParaRPr lang="en-US"/>
           </a:p>
@@ -1745,7 +1749,7 @@
           <a:p>
             <a:fld id="{0703EC54-8FB1-4E12-A495-72A239CB266A}" type="datetimeFigureOut">
               <a:rPr lang="en-US" smtClean="0"/>
-              <a:t>7/20/2024</a:t>
+              <a:t>7/21/2024</a:t>
             </a:fld>
             <a:endParaRPr lang="en-US"/>
           </a:p>
@@ -2010,7 +2014,7 @@
           <a:p>
             <a:fld id="{0703EC54-8FB1-4E12-A495-72A239CB266A}" type="datetimeFigureOut">
               <a:rPr lang="en-US" smtClean="0"/>
-              <a:t>7/20/2024</a:t>
+              <a:t>7/21/2024</a:t>
             </a:fld>
             <a:endParaRPr lang="en-US"/>
           </a:p>
@@ -2422,7 +2426,7 @@
           <a:p>
             <a:fld id="{0703EC54-8FB1-4E12-A495-72A239CB266A}" type="datetimeFigureOut">
               <a:rPr lang="en-US" smtClean="0"/>
-              <a:t>7/20/2024</a:t>
+              <a:t>7/21/2024</a:t>
             </a:fld>
             <a:endParaRPr lang="en-US"/>
           </a:p>
@@ -2563,7 +2567,7 @@
           <a:p>
             <a:fld id="{0703EC54-8FB1-4E12-A495-72A239CB266A}" type="datetimeFigureOut">
               <a:rPr lang="en-US" smtClean="0"/>
-              <a:t>7/20/2024</a:t>
+              <a:t>7/21/2024</a:t>
             </a:fld>
             <a:endParaRPr lang="en-US"/>
           </a:p>
@@ -2676,7 +2680,7 @@
           <a:p>
             <a:fld id="{0703EC54-8FB1-4E12-A495-72A239CB266A}" type="datetimeFigureOut">
               <a:rPr lang="en-US" smtClean="0"/>
-              <a:t>7/20/2024</a:t>
+              <a:t>7/21/2024</a:t>
             </a:fld>
             <a:endParaRPr lang="en-US"/>
           </a:p>
@@ -2987,7 +2991,7 @@
           <a:p>
             <a:fld id="{0703EC54-8FB1-4E12-A495-72A239CB266A}" type="datetimeFigureOut">
               <a:rPr lang="en-US" smtClean="0"/>
-              <a:t>7/20/2024</a:t>
+              <a:t>7/21/2024</a:t>
             </a:fld>
             <a:endParaRPr lang="en-US"/>
           </a:p>
@@ -3275,7 +3279,7 @@
           <a:p>
             <a:fld id="{0703EC54-8FB1-4E12-A495-72A239CB266A}" type="datetimeFigureOut">
               <a:rPr lang="en-US" smtClean="0"/>
-              <a:t>7/20/2024</a:t>
+              <a:t>7/21/2024</a:t>
             </a:fld>
             <a:endParaRPr lang="en-US"/>
           </a:p>
@@ -3516,7 +3520,7 @@
           <a:p>
             <a:fld id="{0703EC54-8FB1-4E12-A495-72A239CB266A}" type="datetimeFigureOut">
               <a:rPr lang="en-US" smtClean="0"/>
-              <a:t>7/20/2024</a:t>
+              <a:t>7/21/2024</a:t>
             </a:fld>
             <a:endParaRPr lang="en-US"/>
           </a:p>

</xml_diff>